<commit_message>
started cleaning up code not much done tho
</commit_message>
<xml_diff>
--- a/Posters/2024-math-conference-group-poster-template.pptx
+++ b/Posters/2024-math-conference-group-poster-template.pptx
@@ -533,7 +533,7 @@
               <a:pPr>
                 <a:defRPr/>
               </a:pPr>
-              <a:t>7/12/24</a:t>
+              <a:t>7/15/24</a:t>
             </a:fld>
             <a:endParaRPr lang="en-US"/>
           </a:p>
@@ -12504,7 +12504,7 @@
         <p:spPr>
           <a:xfrm>
             <a:off x="22666571" y="22813069"/>
-            <a:ext cx="13185365" cy="9283687"/>
+            <a:ext cx="12597863" cy="9283687"/>
           </a:xfrm>
           <a:prstGeom prst="rect">
             <a:avLst/>
@@ -12684,7 +12684,7 @@
                 <a:cs typeface="Helvetica Neue"/>
                 <a:sym typeface="Helvetica Neue"/>
               </a:rPr>
-              <a:t>) and dorsal lateral striatum (DLS). Dopaminergic projections from the ventral tegmental area highly modulates the activity of the </a:t>
+              <a:t>) and dorsal lateral striatum (DLS). Dopaminergic projections from the ventral tegmental area modulates the activity of the </a:t>
             </a:r>
             <a:r>
               <a:rPr lang="en-US" dirty="0" err="1">
@@ -13216,6 +13216,51 @@
           <a:prstGeom prst="rect">
             <a:avLst/>
           </a:prstGeom>
+        </p:spPr>
+      </p:pic>
+      <p:pic>
+        <p:nvPicPr>
+          <p:cNvPr id="1026" name="Picture 2">
+            <a:extLst>
+              <a:ext uri="{FF2B5EF4-FFF2-40B4-BE49-F238E27FC236}">
+                <a16:creationId xmlns:a16="http://schemas.microsoft.com/office/drawing/2014/main" id="{26C23FA6-2DCD-B26D-A00F-A867ED17FB37}"/>
+              </a:ext>
+            </a:extLst>
+          </p:cNvPr>
+          <p:cNvPicPr>
+            <a:picLocks noChangeAspect="1" noChangeArrowheads="1"/>
+          </p:cNvPicPr>
+          <p:nvPr/>
+        </p:nvPicPr>
+        <p:blipFill rotWithShape="1">
+          <a:blip r:embed="rId8">
+            <a:extLst>
+              <a:ext uri="{28A0092B-C50C-407E-A947-70E740481C1C}">
+                <a14:useLocalDpi xmlns:a14="http://schemas.microsoft.com/office/drawing/2010/main" val="0"/>
+              </a:ext>
+            </a:extLst>
+          </a:blip>
+          <a:srcRect l="25545" t="31500"/>
+          <a:stretch/>
+        </p:blipFill>
+        <p:spPr bwMode="auto">
+          <a:xfrm>
+            <a:off x="35428801" y="22959369"/>
+            <a:ext cx="6956922" cy="6809431"/>
+          </a:xfrm>
+          <a:prstGeom prst="rect">
+            <a:avLst/>
+          </a:prstGeom>
+          <a:noFill/>
+          <a:extLst>
+            <a:ext uri="{909E8E84-426E-40DD-AFC4-6F175D3DCCD1}">
+              <a14:hiddenFill xmlns:a14="http://schemas.microsoft.com/office/drawing/2010/main">
+                <a:solidFill>
+                  <a:srgbClr val="FFFFFF"/>
+                </a:solidFill>
+              </a14:hiddenFill>
+            </a:ext>
+          </a:extLst>
         </p:spPr>
       </p:pic>
     </p:spTree>

</xml_diff>